<commit_message>
Updated requirements.txt and added log files to gitignore
</commit_message>
<xml_diff>
--- a/Documentation/functionality_flow.pptx
+++ b/Documentation/functionality_flow.pptx
@@ -108,6 +108,11 @@
       </a:defRPr>
     </a:lvl9pPr>
   </p:defaultTextStyle>
+  <p:extLst>
+    <p:ext uri="{EFAFB233-063F-42B5-8137-9DF3F51BA10A}">
+      <p15:sldGuideLst xmlns:p15="http://schemas.microsoft.com/office/powerpoint/2012/main"/>
+    </p:ext>
+  </p:extLst>
 </p:presentation>
 </file>
 
@@ -242,7 +247,7 @@
           <a:p>
             <a:fld id="{5AC94870-34DD-46B3-B57D-54DA67FE22A0}" type="datetimeFigureOut">
               <a:rPr lang="en-US" smtClean="0"/>
-              <a:t>3/17/2023</a:t>
+              <a:t>3/19/2023</a:t>
             </a:fld>
             <a:endParaRPr lang="en-US"/>
           </a:p>
@@ -412,7 +417,7 @@
           <a:p>
             <a:fld id="{5AC94870-34DD-46B3-B57D-54DA67FE22A0}" type="datetimeFigureOut">
               <a:rPr lang="en-US" smtClean="0"/>
-              <a:t>3/17/2023</a:t>
+              <a:t>3/19/2023</a:t>
             </a:fld>
             <a:endParaRPr lang="en-US"/>
           </a:p>
@@ -592,7 +597,7 @@
           <a:p>
             <a:fld id="{5AC94870-34DD-46B3-B57D-54DA67FE22A0}" type="datetimeFigureOut">
               <a:rPr lang="en-US" smtClean="0"/>
-              <a:t>3/17/2023</a:t>
+              <a:t>3/19/2023</a:t>
             </a:fld>
             <a:endParaRPr lang="en-US"/>
           </a:p>
@@ -762,7 +767,7 @@
           <a:p>
             <a:fld id="{5AC94870-34DD-46B3-B57D-54DA67FE22A0}" type="datetimeFigureOut">
               <a:rPr lang="en-US" smtClean="0"/>
-              <a:t>3/17/2023</a:t>
+              <a:t>3/19/2023</a:t>
             </a:fld>
             <a:endParaRPr lang="en-US"/>
           </a:p>
@@ -1008,7 +1013,7 @@
           <a:p>
             <a:fld id="{5AC94870-34DD-46B3-B57D-54DA67FE22A0}" type="datetimeFigureOut">
               <a:rPr lang="en-US" smtClean="0"/>
-              <a:t>3/17/2023</a:t>
+              <a:t>3/19/2023</a:t>
             </a:fld>
             <a:endParaRPr lang="en-US"/>
           </a:p>
@@ -1240,7 +1245,7 @@
           <a:p>
             <a:fld id="{5AC94870-34DD-46B3-B57D-54DA67FE22A0}" type="datetimeFigureOut">
               <a:rPr lang="en-US" smtClean="0"/>
-              <a:t>3/17/2023</a:t>
+              <a:t>3/19/2023</a:t>
             </a:fld>
             <a:endParaRPr lang="en-US"/>
           </a:p>
@@ -1607,7 +1612,7 @@
           <a:p>
             <a:fld id="{5AC94870-34DD-46B3-B57D-54DA67FE22A0}" type="datetimeFigureOut">
               <a:rPr lang="en-US" smtClean="0"/>
-              <a:t>3/17/2023</a:t>
+              <a:t>3/19/2023</a:t>
             </a:fld>
             <a:endParaRPr lang="en-US"/>
           </a:p>
@@ -1725,7 +1730,7 @@
           <a:p>
             <a:fld id="{5AC94870-34DD-46B3-B57D-54DA67FE22A0}" type="datetimeFigureOut">
               <a:rPr lang="en-US" smtClean="0"/>
-              <a:t>3/17/2023</a:t>
+              <a:t>3/19/2023</a:t>
             </a:fld>
             <a:endParaRPr lang="en-US"/>
           </a:p>
@@ -1820,7 +1825,7 @@
           <a:p>
             <a:fld id="{5AC94870-34DD-46B3-B57D-54DA67FE22A0}" type="datetimeFigureOut">
               <a:rPr lang="en-US" smtClean="0"/>
-              <a:t>3/17/2023</a:t>
+              <a:t>3/19/2023</a:t>
             </a:fld>
             <a:endParaRPr lang="en-US"/>
           </a:p>
@@ -2097,7 +2102,7 @@
           <a:p>
             <a:fld id="{5AC94870-34DD-46B3-B57D-54DA67FE22A0}" type="datetimeFigureOut">
               <a:rPr lang="en-US" smtClean="0"/>
-              <a:t>3/17/2023</a:t>
+              <a:t>3/19/2023</a:t>
             </a:fld>
             <a:endParaRPr lang="en-US"/>
           </a:p>
@@ -2354,7 +2359,7 @@
           <a:p>
             <a:fld id="{5AC94870-34DD-46B3-B57D-54DA67FE22A0}" type="datetimeFigureOut">
               <a:rPr lang="en-US" smtClean="0"/>
-              <a:t>3/17/2023</a:t>
+              <a:t>3/19/2023</a:t>
             </a:fld>
             <a:endParaRPr lang="en-US"/>
           </a:p>
@@ -2567,7 +2572,7 @@
           <a:p>
             <a:fld id="{5AC94870-34DD-46B3-B57D-54DA67FE22A0}" type="datetimeFigureOut">
               <a:rPr lang="en-US" smtClean="0"/>
-              <a:t>3/17/2023</a:t>
+              <a:t>3/19/2023</a:t>
             </a:fld>
             <a:endParaRPr lang="en-US"/>
           </a:p>
@@ -3103,22 +3108,6 @@
               <a:t>3/17/2023</a:t>
             </a:r>
           </a:p>
-          <a:p>
-            <a:pPr algn="l"/>
-            <a:r>
-              <a:rPr lang="en-US" sz="2000" dirty="0" err="1"/>
-              <a:t>Todo</a:t>
-            </a:r>
-            <a:r>
-              <a:rPr lang="en-US" sz="2000" dirty="0"/>
-              <a:t>: album, artist </a:t>
-            </a:r>
-            <a:r>
-              <a:rPr lang="en-US" sz="2000" dirty="0" err="1"/>
-              <a:t>sl</a:t>
-            </a:r>
-            <a:endParaRPr lang="en-US" sz="2000" dirty="0"/>
-          </a:p>
         </p:txBody>
       </p:sp>
     </p:spTree>
@@ -3193,7 +3182,15 @@
             </a:r>
             <a:r>
               <a:rPr lang="en-US" b="1" dirty="0"/>
-              <a:t>on screen after “track search” selected</a:t>
+              <a:t>on screen </a:t>
+            </a:r>
+            <a:r>
+              <a:rPr lang="en-US" b="1"/>
+              <a:t>after “track </a:t>
+            </a:r>
+            <a:r>
+              <a:rPr lang="en-US" b="1" dirty="0"/>
+              <a:t>search” selected</a:t>
             </a:r>
           </a:p>
         </p:txBody>
@@ -3276,13 +3273,13 @@
               <a:rPr lang="en-US" sz="1600">
                 <a:latin typeface="+mj-lt"/>
               </a:rPr>
-              <a:t>_tracks(</a:t>
+              <a:t>_tracks</a:t>
             </a:r>
             <a:r>
               <a:rPr lang="en-US" sz="1600" dirty="0">
                 <a:latin typeface="+mj-lt"/>
               </a:rPr>
-              <a:t>User)</a:t>
+              <a:t>(User)</a:t>
             </a:r>
           </a:p>
         </p:txBody>
@@ -3330,16 +3327,22 @@
           <a:p>
             <a:pPr algn="ctr"/>
             <a:r>
-              <a:rPr lang="en-US" sz="1600" dirty="0">
+              <a:rPr lang="en-US" sz="1600">
                 <a:latin typeface="+mj-lt"/>
               </a:rPr>
               <a:t>[</a:t>
             </a:r>
             <a:r>
+              <a:rPr lang="en-US" sz="1600" b="1" i="1">
+                <a:latin typeface="+mj-lt"/>
+              </a:rPr>
+              <a:t>Track.</a:t>
+            </a:r>
+            <a:r>
               <a:rPr lang="en-US" sz="1600" b="1" i="1" dirty="0">
                 <a:latin typeface="+mj-lt"/>
               </a:rPr>
-              <a:t>Track.js</a:t>
+              <a:t>js</a:t>
             </a:r>
             <a:r>
               <a:rPr lang="en-US" sz="1600" dirty="0">
@@ -3422,11 +3425,14 @@
               <a:rPr lang="en-US" sz="1600">
                 <a:latin typeface="+mj-lt"/>
               </a:rPr>
-              <a:t>(tracks);</a:t>
-            </a:r>
-            <a:endParaRPr lang="en-US" sz="1600" dirty="0">
-              <a:latin typeface="+mj-lt"/>
-            </a:endParaRPr>
+              <a:t>(tracks</a:t>
+            </a:r>
+            <a:r>
+              <a:rPr lang="en-US" sz="1600" dirty="0">
+                <a:latin typeface="+mj-lt"/>
+              </a:rPr>
+              <a:t>);</a:t>
+            </a:r>
           </a:p>
         </p:txBody>
       </p:sp>
@@ -3534,11 +3540,14 @@
               <a:rPr lang="en-US" sz="1600">
                 <a:latin typeface="+mj-lt"/>
               </a:rPr>
-              <a:t>(tracks);</a:t>
-            </a:r>
-            <a:endParaRPr lang="en-US" sz="1600" dirty="0">
-              <a:latin typeface="+mj-lt"/>
-            </a:endParaRPr>
+              <a:t>(tracks</a:t>
+            </a:r>
+            <a:r>
+              <a:rPr lang="en-US" sz="1600" dirty="0">
+                <a:latin typeface="+mj-lt"/>
+              </a:rPr>
+              <a:t>);</a:t>
+            </a:r>
           </a:p>
         </p:txBody>
       </p:sp>
@@ -3603,11 +3612,14 @@
               <a:rPr lang="en-US" sz="1600">
                 <a:latin typeface="+mj-lt"/>
               </a:rPr>
-              <a:t>(tracks);</a:t>
-            </a:r>
-            <a:endParaRPr lang="en-US" sz="1600" dirty="0">
-              <a:latin typeface="+mj-lt"/>
-            </a:endParaRPr>
+              <a:t>(tracks</a:t>
+            </a:r>
+            <a:r>
+              <a:rPr lang="en-US" sz="1600" dirty="0">
+                <a:latin typeface="+mj-lt"/>
+              </a:rPr>
+              <a:t>);</a:t>
+            </a:r>
           </a:p>
         </p:txBody>
       </p:sp>
@@ -3700,16 +3712,22 @@
           <a:p>
             <a:pPr algn="ctr"/>
             <a:r>
-              <a:rPr lang="en-US" sz="1600" dirty="0">
+              <a:rPr lang="en-US" sz="1600">
                 <a:latin typeface="+mj-lt"/>
               </a:rPr>
               <a:t>[</a:t>
             </a:r>
             <a:r>
+              <a:rPr lang="en-US" sz="1600" b="1" i="1">
+                <a:latin typeface="+mj-lt"/>
+              </a:rPr>
+              <a:t>Track.</a:t>
+            </a:r>
+            <a:r>
               <a:rPr lang="en-US" sz="1600" b="1" i="1" dirty="0">
                 <a:latin typeface="+mj-lt"/>
               </a:rPr>
-              <a:t>Track.js</a:t>
+              <a:t>js</a:t>
             </a:r>
             <a:r>
               <a:rPr lang="en-US" sz="1600" dirty="0">
@@ -3744,13 +3762,13 @@
               <a:rPr lang="en-US" sz="1600">
                 <a:latin typeface="+mj-lt"/>
               </a:rPr>
-              <a:t>_tracks(</a:t>
+              <a:t>_tracks</a:t>
             </a:r>
             <a:r>
               <a:rPr lang="en-US" sz="1600" dirty="0">
                 <a:latin typeface="+mj-lt"/>
               </a:rPr>
-              <a:t>User)</a:t>
+              <a:t>(User)</a:t>
             </a:r>
           </a:p>
         </p:txBody>
@@ -3856,16 +3874,22 @@
           <a:p>
             <a:pPr algn="ctr"/>
             <a:r>
-              <a:rPr lang="en-US" sz="1600" dirty="0">
+              <a:rPr lang="en-US" sz="1600">
                 <a:latin typeface="+mj-lt"/>
               </a:rPr>
               <a:t>[</a:t>
             </a:r>
             <a:r>
+              <a:rPr lang="en-US" sz="1600" b="1" i="1">
+                <a:latin typeface="+mj-lt"/>
+              </a:rPr>
+              <a:t>Track.</a:t>
+            </a:r>
+            <a:r>
               <a:rPr lang="en-US" sz="1600" b="1" i="1" dirty="0">
                 <a:latin typeface="+mj-lt"/>
               </a:rPr>
-              <a:t>Track.py</a:t>
+              <a:t>py</a:t>
             </a:r>
             <a:r>
               <a:rPr lang="en-US" sz="1600" dirty="0">
@@ -4273,13 +4297,25 @@
               <a:rPr lang="en-US" sz="1600" dirty="0" err="1">
                 <a:latin typeface="+mj-lt"/>
               </a:rPr>
-              <a:t>compare_tags_track</a:t>
+              <a:t>compare_</a:t>
+            </a:r>
+            <a:r>
+              <a:rPr lang="en-US" sz="1600" err="1">
+                <a:latin typeface="+mj-lt"/>
+              </a:rPr>
+              <a:t>tags</a:t>
+            </a:r>
+            <a:r>
+              <a:rPr lang="en-US" sz="1600">
+                <a:latin typeface="+mj-lt"/>
+              </a:rPr>
+              <a:t>_track(</a:t>
             </a:r>
             <a:r>
               <a:rPr lang="en-US" sz="1600" dirty="0">
                 <a:latin typeface="+mj-lt"/>
               </a:rPr>
-              <a:t>(User, tags)</a:t>
+              <a:t>User, tags)</a:t>
             </a:r>
           </a:p>
         </p:txBody>
@@ -4375,43 +4411,49 @@
           <a:p>
             <a:pPr algn="ctr"/>
             <a:r>
+              <a:rPr lang="en-US" sz="1600">
+                <a:latin typeface="+mj-lt"/>
+              </a:rPr>
+              <a:t>[</a:t>
+            </a:r>
+            <a:r>
+              <a:rPr lang="en-US" sz="1600" b="1" i="1">
+                <a:latin typeface="+mj-lt"/>
+              </a:rPr>
+              <a:t>Track.</a:t>
+            </a:r>
+            <a:r>
+              <a:rPr lang="en-US" sz="1600" b="1" i="1" dirty="0">
+                <a:latin typeface="+mj-lt"/>
+              </a:rPr>
+              <a:t>py</a:t>
+            </a:r>
+            <a:r>
               <a:rPr lang="en-US" sz="1600" dirty="0">
                 <a:latin typeface="+mj-lt"/>
               </a:rPr>
-              <a:t>[</a:t>
-            </a:r>
-            <a:r>
-              <a:rPr lang="en-US" sz="1600" b="1" i="1" dirty="0">
-                <a:latin typeface="+mj-lt"/>
-              </a:rPr>
-              <a:t>Track.py</a:t>
-            </a:r>
+              <a:t>]</a:t>
+            </a:r>
+          </a:p>
+          <a:p>
+            <a:pPr algn="ctr"/>
             <a:r>
               <a:rPr lang="en-US" sz="1600" dirty="0">
                 <a:latin typeface="+mj-lt"/>
               </a:rPr>
-              <a:t>]</a:t>
-            </a:r>
-          </a:p>
-          <a:p>
-            <a:pPr algn="ctr"/>
+              <a:t>output_top_</a:t>
+            </a:r>
+            <a:r>
+              <a:rPr lang="en-US" sz="1600">
+                <a:latin typeface="+mj-lt"/>
+              </a:rPr>
+              <a:t>3_tracks</a:t>
+            </a:r>
             <a:r>
               <a:rPr lang="en-US" sz="1600" dirty="0">
                 <a:latin typeface="+mj-lt"/>
               </a:rPr>
-              <a:t>output_top_</a:t>
-            </a:r>
-            <a:r>
-              <a:rPr lang="en-US" sz="1600">
-                <a:latin typeface="+mj-lt"/>
-              </a:rPr>
-              <a:t>3_tracks(</a:t>
-            </a:r>
-            <a:r>
-              <a:rPr lang="en-US" sz="1600" dirty="0">
-                <a:latin typeface="+mj-lt"/>
-              </a:rPr>
-              <a:t>User, matches)</a:t>
+              <a:t>(User, matches)</a:t>
             </a:r>
           </a:p>
         </p:txBody>
@@ -4450,7 +4492,23 @@
                   <a:schemeClr val="accent2"/>
                 </a:solidFill>
               </a:rPr>
-              <a:t>Compare_tags_track</a:t>
+              <a:t>Compare_</a:t>
+            </a:r>
+            <a:r>
+              <a:rPr lang="en-US" sz="900" err="1">
+                <a:solidFill>
+                  <a:schemeClr val="accent2"/>
+                </a:solidFill>
+              </a:rPr>
+              <a:t>tags</a:t>
+            </a:r>
+            <a:r>
+              <a:rPr lang="en-US" sz="900">
+                <a:solidFill>
+                  <a:schemeClr val="accent2"/>
+                </a:solidFill>
+              </a:rPr>
+              <a:t>_track() </a:t>
             </a:r>
             <a:r>
               <a:rPr lang="en-US" sz="900" dirty="0">
@@ -4458,7 +4516,7 @@
                   <a:schemeClr val="accent2"/>
                 </a:solidFill>
               </a:rPr>
-              <a:t>() – this will compare the user </a:t>
+              <a:t>– this will compare the user </a:t>
             </a:r>
             <a:r>
               <a:rPr lang="en-US" sz="900" dirty="0" err="1">
@@ -4525,16 +4583,22 @@
           <a:p>
             <a:pPr algn="ctr"/>
             <a:r>
-              <a:rPr lang="en-US" sz="1100" dirty="0">
+              <a:rPr lang="en-US" sz="1100">
                 <a:latin typeface="+mj-lt"/>
               </a:rPr>
               <a:t>[</a:t>
             </a:r>
             <a:r>
+              <a:rPr lang="en-US" sz="1100" b="1" i="1">
+                <a:latin typeface="+mj-lt"/>
+              </a:rPr>
+              <a:t>Track.</a:t>
+            </a:r>
+            <a:r>
               <a:rPr lang="en-US" sz="1100" b="1" i="1" dirty="0">
                 <a:latin typeface="+mj-lt"/>
               </a:rPr>
-              <a:t>Track.py</a:t>
+              <a:t>py</a:t>
             </a:r>
             <a:r>
               <a:rPr lang="en-US" sz="1100" dirty="0">
@@ -4590,13 +4654,13 @@
               <a:rPr lang="en-US" sz="1100">
                 <a:latin typeface="+mj-lt"/>
               </a:rPr>
-              <a:t>_tracks(</a:t>
+              <a:t>_tracks</a:t>
             </a:r>
             <a:r>
               <a:rPr lang="en-US" sz="1100" dirty="0">
                 <a:latin typeface="+mj-lt"/>
               </a:rPr>
-              <a:t>User, tags)</a:t>
+              <a:t>(User, tags)</a:t>
             </a:r>
           </a:p>
           <a:p>
@@ -4623,13 +4687,13 @@
               <a:rPr lang="en-US" sz="1100">
                 <a:latin typeface="+mj-lt"/>
               </a:rPr>
-              <a:t>3_tracks(</a:t>
+              <a:t>3_tracks</a:t>
             </a:r>
             <a:r>
               <a:rPr lang="en-US" sz="1100" dirty="0">
                 <a:latin typeface="+mj-lt"/>
               </a:rPr>
-              <a:t>User, matches)</a:t>
+              <a:t>(User, matches)</a:t>
             </a:r>
           </a:p>
           <a:p>
@@ -4983,7 +5047,7 @@
               <a:rPr lang="en-US" sz="1600" b="1" i="1" dirty="0">
                 <a:latin typeface="+mj-lt"/>
               </a:rPr>
-              <a:t>Track.js</a:t>
+              <a:t>Album.js</a:t>
             </a:r>
             <a:r>
               <a:rPr lang="en-US" sz="1600" dirty="0">
@@ -5286,7 +5350,7 @@
         <p:spPr>
           <a:xfrm>
             <a:off x="3517776" y="1802167"/>
-            <a:ext cx="2260109" cy="675648"/>
+            <a:ext cx="2431920" cy="675648"/>
           </a:xfrm>
           <a:prstGeom prst="flowChartProcess">
             <a:avLst/>
@@ -5326,7 +5390,7 @@
               <a:rPr lang="en-US" sz="1600" b="1" i="1" dirty="0">
                 <a:latin typeface="+mj-lt"/>
               </a:rPr>
-              <a:t>Track.js</a:t>
+              <a:t>Album.js</a:t>
             </a:r>
             <a:r>
               <a:rPr lang="en-US" sz="1600" dirty="0">
@@ -5470,7 +5534,7 @@
               <a:rPr lang="en-US" sz="1600" b="1" i="1" dirty="0">
                 <a:latin typeface="+mj-lt"/>
               </a:rPr>
-              <a:t>Track.py</a:t>
+              <a:t>Album.py</a:t>
             </a:r>
             <a:r>
               <a:rPr lang="en-US" sz="1600" dirty="0">
@@ -5797,7 +5861,7 @@
         <p:spPr>
           <a:xfrm>
             <a:off x="2659461" y="5396057"/>
-            <a:ext cx="1850395" cy="782033"/>
+            <a:ext cx="1991787" cy="782033"/>
           </a:xfrm>
           <a:prstGeom prst="flowChartProcess">
             <a:avLst/>
@@ -5854,7 +5918,7 @@
               <a:rPr lang="en-US" sz="1600" dirty="0" err="1">
                 <a:latin typeface="+mj-lt"/>
               </a:rPr>
-              <a:t>compare_tags_track</a:t>
+              <a:t>compare_tags_Album</a:t>
             </a:r>
             <a:r>
               <a:rPr lang="en-US" sz="1600" dirty="0">
@@ -5883,8 +5947,8 @@
         </p:nvCxnSpPr>
         <p:spPr>
           <a:xfrm rot="5400000">
-            <a:off x="2541194" y="1828512"/>
-            <a:ext cx="1457334" cy="2755940"/>
+            <a:off x="2584147" y="1785560"/>
+            <a:ext cx="1457334" cy="2841845"/>
           </a:xfrm>
           <a:prstGeom prst="bentConnector3">
             <a:avLst>
@@ -5965,7 +6029,7 @@
               <a:rPr lang="en-US" sz="1600" b="1" i="1" dirty="0">
                 <a:latin typeface="+mj-lt"/>
               </a:rPr>
-              <a:t>Track.py</a:t>
+              <a:t>Album.py</a:t>
             </a:r>
             <a:r>
               <a:rPr lang="en-US" sz="1600" dirty="0">
@@ -6019,7 +6083,7 @@
                   <a:schemeClr val="accent2"/>
                 </a:solidFill>
               </a:rPr>
-              <a:t>Compare_tags_track</a:t>
+              <a:t>Compare_tags_Album</a:t>
             </a:r>
             <a:r>
               <a:rPr lang="en-US" sz="900" dirty="0">
@@ -6103,7 +6167,7 @@
               <a:rPr lang="en-US" sz="1100" b="1" i="1" dirty="0">
                 <a:latin typeface="+mj-lt"/>
               </a:rPr>
-              <a:t>Track.py</a:t>
+              <a:t>Album.py</a:t>
             </a:r>
             <a:r>
               <a:rPr lang="en-US" sz="1100" dirty="0">
@@ -6278,8 +6342,8 @@
         </p:nvCxnSpPr>
         <p:spPr>
           <a:xfrm flipV="1">
-            <a:off x="4509856" y="4657065"/>
-            <a:ext cx="737717" cy="1130009"/>
+            <a:off x="4651248" y="4657065"/>
+            <a:ext cx="596325" cy="1130009"/>
           </a:xfrm>
           <a:prstGeom prst="bentConnector2">
             <a:avLst/>
@@ -6367,7 +6431,23 @@
             </a:r>
             <a:r>
               <a:rPr lang="en-US" b="1" dirty="0"/>
-              <a:t>Display 3 artists on screen after “artists search” selected</a:t>
+              <a:t>Display </a:t>
+            </a:r>
+            <a:r>
+              <a:rPr lang="en-US" b="1"/>
+              <a:t>3 artists </a:t>
+            </a:r>
+            <a:r>
+              <a:rPr lang="en-US" b="1" dirty="0"/>
+              <a:t>on screen </a:t>
+            </a:r>
+            <a:r>
+              <a:rPr lang="en-US" b="1"/>
+              <a:t>after “artists </a:t>
+            </a:r>
+            <a:r>
+              <a:rPr lang="en-US" b="1" dirty="0"/>
+              <a:t>search” selected</a:t>
             </a:r>
           </a:p>
         </p:txBody>
@@ -6441,10 +6521,16 @@
               </a:rPr>
             </a:br>
             <a:r>
-              <a:rPr lang="en-US" sz="1600" dirty="0" err="1">
-                <a:latin typeface="+mj-lt"/>
-              </a:rPr>
-              <a:t>display_artists</a:t>
+              <a:rPr lang="en-US" sz="1600" err="1">
+                <a:latin typeface="+mj-lt"/>
+              </a:rPr>
+              <a:t>display</a:t>
+            </a:r>
+            <a:r>
+              <a:rPr lang="en-US" sz="1600">
+                <a:latin typeface="+mj-lt"/>
+              </a:rPr>
+              <a:t>_artists</a:t>
             </a:r>
             <a:r>
               <a:rPr lang="en-US" sz="1600" dirty="0">
@@ -6507,7 +6593,7 @@
               <a:rPr lang="en-US" sz="1600" b="1" i="1" dirty="0">
                 <a:latin typeface="+mj-lt"/>
               </a:rPr>
-              <a:t>Track.js</a:t>
+              <a:t>Artist.js</a:t>
             </a:r>
             <a:r>
               <a:rPr lang="en-US" sz="1600" dirty="0">
@@ -6578,13 +6664,25 @@
               <a:rPr lang="en-US" sz="1600" dirty="0" err="1">
                 <a:latin typeface="+mj-lt"/>
               </a:rPr>
-              <a:t>display_cover</a:t>
+              <a:t>display_</a:t>
+            </a:r>
+            <a:r>
+              <a:rPr lang="en-US" sz="1600" err="1">
+                <a:latin typeface="+mj-lt"/>
+              </a:rPr>
+              <a:t>cover</a:t>
+            </a:r>
+            <a:r>
+              <a:rPr lang="en-US" sz="1600">
+                <a:latin typeface="+mj-lt"/>
+              </a:rPr>
+              <a:t>(artists</a:t>
             </a:r>
             <a:r>
               <a:rPr lang="en-US" sz="1600" dirty="0">
                 <a:latin typeface="+mj-lt"/>
               </a:rPr>
-              <a:t>(artists);</a:t>
+              <a:t>);</a:t>
             </a:r>
           </a:p>
         </p:txBody>
@@ -6681,13 +6779,25 @@
               <a:rPr lang="en-US" sz="1600" dirty="0" err="1">
                 <a:latin typeface="+mj-lt"/>
               </a:rPr>
-              <a:t>display_name</a:t>
+              <a:t>display_</a:t>
+            </a:r>
+            <a:r>
+              <a:rPr lang="en-US" sz="1600" err="1">
+                <a:latin typeface="+mj-lt"/>
+              </a:rPr>
+              <a:t>name</a:t>
+            </a:r>
+            <a:r>
+              <a:rPr lang="en-US" sz="1600">
+                <a:latin typeface="+mj-lt"/>
+              </a:rPr>
+              <a:t>(artists</a:t>
             </a:r>
             <a:r>
               <a:rPr lang="en-US" sz="1600" dirty="0">
                 <a:latin typeface="+mj-lt"/>
               </a:rPr>
-              <a:t>(artists);</a:t>
+              <a:t>);</a:t>
             </a:r>
           </a:p>
         </p:txBody>
@@ -6741,13 +6851,25 @@
               <a:rPr lang="en-US" sz="1600" dirty="0" err="1">
                 <a:latin typeface="+mj-lt"/>
               </a:rPr>
-              <a:t>display_summary</a:t>
+              <a:t>display_</a:t>
+            </a:r>
+            <a:r>
+              <a:rPr lang="en-US" sz="1600" err="1">
+                <a:latin typeface="+mj-lt"/>
+              </a:rPr>
+              <a:t>summary</a:t>
+            </a:r>
+            <a:r>
+              <a:rPr lang="en-US" sz="1600">
+                <a:latin typeface="+mj-lt"/>
+              </a:rPr>
+              <a:t>(artists</a:t>
             </a:r>
             <a:r>
               <a:rPr lang="en-US" sz="1600" dirty="0">
                 <a:latin typeface="+mj-lt"/>
               </a:rPr>
-              <a:t>(artists);</a:t>
+              <a:t>);</a:t>
             </a:r>
           </a:p>
         </p:txBody>
@@ -6850,7 +6972,7 @@
               <a:rPr lang="en-US" sz="1600" b="1" i="1" dirty="0">
                 <a:latin typeface="+mj-lt"/>
               </a:rPr>
-              <a:t>Track.js</a:t>
+              <a:t>Artist.js</a:t>
             </a:r>
             <a:r>
               <a:rPr lang="en-US" sz="1600" dirty="0">
@@ -6994,7 +7116,7 @@
               <a:rPr lang="en-US" sz="1600" b="1" i="1" dirty="0">
                 <a:latin typeface="+mj-lt"/>
               </a:rPr>
-              <a:t>Track.py</a:t>
+              <a:t>Artist.py</a:t>
             </a:r>
             <a:r>
               <a:rPr lang="en-US" sz="1600" dirty="0">
@@ -7094,12 +7216,52 @@
           <a:lstStyle/>
           <a:p>
             <a:r>
+              <a:rPr lang="en-US" sz="900">
+                <a:solidFill>
+                  <a:schemeClr val="accent2"/>
+                </a:solidFill>
+              </a:rPr>
+              <a:t>artists </a:t>
+            </a:r>
+            <a:r>
               <a:rPr lang="en-US" sz="900" dirty="0">
                 <a:solidFill>
                   <a:schemeClr val="accent2"/>
                 </a:solidFill>
               </a:rPr>
-              <a:t>artists – list of 3 artists for user, which contain name, artist, cover, summary</a:t>
+              <a:t>– list of </a:t>
+            </a:r>
+            <a:r>
+              <a:rPr lang="en-US" sz="900">
+                <a:solidFill>
+                  <a:schemeClr val="accent2"/>
+                </a:solidFill>
+              </a:rPr>
+              <a:t>3 artists </a:t>
+            </a:r>
+            <a:r>
+              <a:rPr lang="en-US" sz="900" dirty="0">
+                <a:solidFill>
+                  <a:schemeClr val="accent2"/>
+                </a:solidFill>
+              </a:rPr>
+              <a:t>for user, which contain name</a:t>
+            </a:r>
+            <a:r>
+              <a:rPr lang="en-US" sz="900">
+                <a:solidFill>
+                  <a:schemeClr val="accent2"/>
+                </a:solidFill>
+              </a:rPr>
+              <a:t>, artist, </a:t>
+            </a:r>
+            <a:r>
+              <a:rPr lang="en-US" sz="900" dirty="0">
+                <a:solidFill>
+                  <a:schemeClr val="accent2"/>
+                </a:solidFill>
+              </a:rPr>
+              <a:t>cover, summary</a:t>
             </a:r>
           </a:p>
         </p:txBody>
@@ -7321,7 +7483,7 @@
         <p:spPr>
           <a:xfrm>
             <a:off x="2659461" y="5396057"/>
-            <a:ext cx="1850395" cy="782033"/>
+            <a:ext cx="1913218" cy="782033"/>
           </a:xfrm>
           <a:prstGeom prst="flowChartProcess">
             <a:avLst/>
@@ -7378,7 +7540,7 @@
               <a:rPr lang="en-US" sz="1600" dirty="0" err="1">
                 <a:latin typeface="+mj-lt"/>
               </a:rPr>
-              <a:t>compare_tags_track</a:t>
+              <a:t>compare_tags_Artist</a:t>
             </a:r>
             <a:r>
               <a:rPr lang="en-US" sz="1600" dirty="0">
@@ -7489,7 +7651,7 @@
               <a:rPr lang="en-US" sz="1600" b="1" i="1" dirty="0">
                 <a:latin typeface="+mj-lt"/>
               </a:rPr>
-              <a:t>Track.py</a:t>
+              <a:t>Artist.py</a:t>
             </a:r>
             <a:r>
               <a:rPr lang="en-US" sz="1600" dirty="0">
@@ -7543,7 +7705,7 @@
                   <a:schemeClr val="accent2"/>
                 </a:solidFill>
               </a:rPr>
-              <a:t>Compare_tags_track</a:t>
+              <a:t>Compare_tags_Artist</a:t>
             </a:r>
             <a:r>
               <a:rPr lang="en-US" sz="900" dirty="0">
@@ -7627,7 +7789,7 @@
               <a:rPr lang="en-US" sz="1100" b="1" i="1" dirty="0">
                 <a:latin typeface="+mj-lt"/>
               </a:rPr>
-              <a:t>Track.py</a:t>
+              <a:t>Artist.py</a:t>
             </a:r>
             <a:r>
               <a:rPr lang="en-US" sz="1100" dirty="0">
@@ -7802,8 +7964,8 @@
         </p:nvCxnSpPr>
         <p:spPr>
           <a:xfrm flipV="1">
-            <a:off x="4509856" y="4657065"/>
-            <a:ext cx="667473" cy="1130009"/>
+            <a:off x="4572679" y="4657065"/>
+            <a:ext cx="604650" cy="1130009"/>
           </a:xfrm>
           <a:prstGeom prst="bentConnector2">
             <a:avLst/>
@@ -7917,11 +8079,11 @@
             </a:r>
             <a:r>
               <a:rPr lang="en-US"/>
-              <a:t>data (tracks, </a:t>
+              <a:t>data (tracks</a:t>
             </a:r>
             <a:r>
               <a:rPr lang="en-US" dirty="0"/>
-              <a:t>albums, artists) into the database. Also known as “API Caching”</a:t>
+              <a:t>, albums, artists) into the database. Also known as “API Caching”</a:t>
             </a:r>
           </a:p>
           <a:p>

</xml_diff>